<commit_message>
added photo to powerpoint
</commit_message>
<xml_diff>
--- a/report/presentation.pptx
+++ b/report/presentation.pptx
@@ -110,6 +110,11 @@
       </a:defRPr>
     </a:lvl9pPr>
   </p:defaultTextStyle>
+  <p:extLst>
+    <p:ext uri="{EFAFB233-063F-42B5-8137-9DF3F51BA10A}">
+      <p15:sldGuideLst xmlns:p15="http://schemas.microsoft.com/office/powerpoint/2012/main"/>
+    </p:ext>
+  </p:extLst>
 </p:presentation>
 </file>
 
@@ -283,7 +288,7 @@
             <a:fld id="{87DE6118-2437-4B30-8E3C-4D2BE6020583}" type="datetimeFigureOut">
               <a:rPr lang="en-US" dirty="0"/>
               <a:pPr/>
-              <a:t>4/2/19</a:t>
+              <a:t>4/3/19</a:t>
             </a:fld>
             <a:endParaRPr lang="en-US" dirty="0"/>
           </a:p>
@@ -609,7 +614,7 @@
           <a:p>
             <a:fld id="{87DE6118-2437-4B30-8E3C-4D2BE6020583}" type="datetimeFigureOut">
               <a:rPr lang="en-US" dirty="0"/>
-              <a:t>4/2/19</a:t>
+              <a:t>4/3/19</a:t>
             </a:fld>
             <a:endParaRPr lang="en-US" dirty="0"/>
           </a:p>
@@ -784,7 +789,7 @@
           <a:p>
             <a:fld id="{87DE6118-2437-4B30-8E3C-4D2BE6020583}" type="datetimeFigureOut">
               <a:rPr lang="en-US" dirty="0"/>
-              <a:t>4/2/19</a:t>
+              <a:t>4/3/19</a:t>
             </a:fld>
             <a:endParaRPr lang="en-US" dirty="0"/>
           </a:p>
@@ -949,7 +954,7 @@
           <a:p>
             <a:fld id="{87DE6118-2437-4B30-8E3C-4D2BE6020583}" type="datetimeFigureOut">
               <a:rPr lang="en-US" dirty="0"/>
-              <a:t>4/2/19</a:t>
+              <a:t>4/3/19</a:t>
             </a:fld>
             <a:endParaRPr lang="en-US" dirty="0"/>
           </a:p>
@@ -1222,7 +1227,7 @@
             <a:fld id="{87DE6118-2437-4B30-8E3C-4D2BE6020583}" type="datetimeFigureOut">
               <a:rPr lang="en-US" dirty="0"/>
               <a:pPr/>
-              <a:t>4/2/19</a:t>
+              <a:t>4/3/19</a:t>
             </a:fld>
             <a:endParaRPr lang="en-US" dirty="0"/>
           </a:p>
@@ -1612,7 +1617,7 @@
           <a:p>
             <a:fld id="{87DE6118-2437-4B30-8E3C-4D2BE6020583}" type="datetimeFigureOut">
               <a:rPr lang="en-US" dirty="0"/>
-              <a:t>4/2/19</a:t>
+              <a:t>4/3/19</a:t>
             </a:fld>
             <a:endParaRPr lang="en-US" dirty="0"/>
           </a:p>
@@ -2084,7 +2089,7 @@
           <a:p>
             <a:fld id="{87DE6118-2437-4B30-8E3C-4D2BE6020583}" type="datetimeFigureOut">
               <a:rPr lang="en-US" dirty="0"/>
-              <a:t>4/2/19</a:t>
+              <a:t>4/3/19</a:t>
             </a:fld>
             <a:endParaRPr lang="en-US" dirty="0"/>
           </a:p>
@@ -2197,7 +2202,7 @@
           <a:p>
             <a:fld id="{87DE6118-2437-4B30-8E3C-4D2BE6020583}" type="datetimeFigureOut">
               <a:rPr lang="en-US" dirty="0"/>
-              <a:t>4/2/19</a:t>
+              <a:t>4/3/19</a:t>
             </a:fld>
             <a:endParaRPr lang="en-US" dirty="0"/>
           </a:p>
@@ -2287,7 +2292,7 @@
           <a:p>
             <a:fld id="{87DE6118-2437-4B30-8E3C-4D2BE6020583}" type="datetimeFigureOut">
               <a:rPr lang="en-US" dirty="0"/>
-              <a:t>4/2/19</a:t>
+              <a:t>4/3/19</a:t>
             </a:fld>
             <a:endParaRPr lang="en-US" dirty="0"/>
           </a:p>
@@ -2629,7 +2634,7 @@
             <a:fld id="{87DE6118-2437-4B30-8E3C-4D2BE6020583}" type="datetimeFigureOut">
               <a:rPr lang="en-US" dirty="0"/>
               <a:pPr/>
-              <a:t>4/2/19</a:t>
+              <a:t>4/3/19</a:t>
             </a:fld>
             <a:endParaRPr lang="en-US" dirty="0"/>
           </a:p>
@@ -3014,7 +3019,7 @@
             <a:fld id="{87DE6118-2437-4B30-8E3C-4D2BE6020583}" type="datetimeFigureOut">
               <a:rPr lang="en-US" dirty="0"/>
               <a:pPr/>
-              <a:t>4/2/19</a:t>
+              <a:t>4/3/19</a:t>
             </a:fld>
             <a:endParaRPr lang="en-US" dirty="0"/>
           </a:p>
@@ -3289,7 +3294,7 @@
             <a:fld id="{87DE6118-2437-4B30-8E3C-4D2BE6020583}" type="datetimeFigureOut">
               <a:rPr lang="en-US" dirty="0"/>
               <a:pPr/>
-              <a:t>4/2/19</a:t>
+              <a:t>4/3/19</a:t>
             </a:fld>
             <a:endParaRPr lang="en-US" dirty="0"/>
           </a:p>
@@ -4550,8 +4555,44 @@
               <a:t>Asynchronous requests to alpha nodes, keeping tabs on the closest k…</a:t>
             </a:r>
           </a:p>
-        </p:txBody>
-      </p:sp>
+          <a:p>
+            <a:r>
+              <a:rPr lang="en-US" dirty="0"/>
+              <a:t>Each request halves the distance to the search value.</a:t>
+            </a:r>
+          </a:p>
+        </p:txBody>
+      </p:sp>
+      <p:pic>
+        <p:nvPicPr>
+          <p:cNvPr id="5" name="Picture 4">
+            <a:extLst>
+              <a:ext uri="{FF2B5EF4-FFF2-40B4-BE49-F238E27FC236}">
+                <a16:creationId xmlns:a16="http://schemas.microsoft.com/office/drawing/2014/main" id="{1351D782-A035-0B47-819D-E451BC1B3B44}"/>
+              </a:ext>
+            </a:extLst>
+          </p:cNvPr>
+          <p:cNvPicPr>
+            <a:picLocks noChangeAspect="1"/>
+          </p:cNvPicPr>
+          <p:nvPr/>
+        </p:nvPicPr>
+        <p:blipFill>
+          <a:blip r:embed="rId2"/>
+          <a:stretch>
+            <a:fillRect/>
+          </a:stretch>
+        </p:blipFill>
+        <p:spPr>
+          <a:xfrm>
+            <a:off x="4373880" y="557481"/>
+            <a:ext cx="7489688" cy="5614719"/>
+          </a:xfrm>
+          <a:prstGeom prst="rect">
+            <a:avLst/>
+          </a:prstGeom>
+        </p:spPr>
+      </p:pic>
     </p:spTree>
     <p:extLst>
       <p:ext uri="{BB962C8B-B14F-4D97-AF65-F5344CB8AC3E}">

</xml_diff>

<commit_message>
added node search slide to presentation
</commit_message>
<xml_diff>
--- a/report/presentation.pptx
+++ b/report/presentation.pptx
@@ -11,7 +11,8 @@
     <p:sldId id="258" r:id="rId5"/>
     <p:sldId id="259" r:id="rId6"/>
     <p:sldId id="260" r:id="rId7"/>
-    <p:sldId id="261" r:id="rId8"/>
+    <p:sldId id="263" r:id="rId8"/>
+    <p:sldId id="261" r:id="rId9"/>
   </p:sldIdLst>
   <p:sldSz cx="12192000" cy="6858000"/>
   <p:notesSz cx="6858000" cy="9144000"/>
@@ -288,7 +289,7 @@
             <a:fld id="{87DE6118-2437-4B30-8E3C-4D2BE6020583}" type="datetimeFigureOut">
               <a:rPr lang="en-US" dirty="0"/>
               <a:pPr/>
-              <a:t>4/3/19</a:t>
+              <a:t>4/4/2019</a:t>
             </a:fld>
             <a:endParaRPr lang="en-US" dirty="0"/>
           </a:p>
@@ -614,7 +615,7 @@
           <a:p>
             <a:fld id="{87DE6118-2437-4B30-8E3C-4D2BE6020583}" type="datetimeFigureOut">
               <a:rPr lang="en-US" dirty="0"/>
-              <a:t>4/3/19</a:t>
+              <a:t>4/4/2019</a:t>
             </a:fld>
             <a:endParaRPr lang="en-US" dirty="0"/>
           </a:p>
@@ -789,7 +790,7 @@
           <a:p>
             <a:fld id="{87DE6118-2437-4B30-8E3C-4D2BE6020583}" type="datetimeFigureOut">
               <a:rPr lang="en-US" dirty="0"/>
-              <a:t>4/3/19</a:t>
+              <a:t>4/4/2019</a:t>
             </a:fld>
             <a:endParaRPr lang="en-US" dirty="0"/>
           </a:p>
@@ -954,7 +955,7 @@
           <a:p>
             <a:fld id="{87DE6118-2437-4B30-8E3C-4D2BE6020583}" type="datetimeFigureOut">
               <a:rPr lang="en-US" dirty="0"/>
-              <a:t>4/3/19</a:t>
+              <a:t>4/4/2019</a:t>
             </a:fld>
             <a:endParaRPr lang="en-US" dirty="0"/>
           </a:p>
@@ -1227,7 +1228,7 @@
             <a:fld id="{87DE6118-2437-4B30-8E3C-4D2BE6020583}" type="datetimeFigureOut">
               <a:rPr lang="en-US" dirty="0"/>
               <a:pPr/>
-              <a:t>4/3/19</a:t>
+              <a:t>4/4/2019</a:t>
             </a:fld>
             <a:endParaRPr lang="en-US" dirty="0"/>
           </a:p>
@@ -1617,7 +1618,7 @@
           <a:p>
             <a:fld id="{87DE6118-2437-4B30-8E3C-4D2BE6020583}" type="datetimeFigureOut">
               <a:rPr lang="en-US" dirty="0"/>
-              <a:t>4/3/19</a:t>
+              <a:t>4/4/2019</a:t>
             </a:fld>
             <a:endParaRPr lang="en-US" dirty="0"/>
           </a:p>
@@ -2089,7 +2090,7 @@
           <a:p>
             <a:fld id="{87DE6118-2437-4B30-8E3C-4D2BE6020583}" type="datetimeFigureOut">
               <a:rPr lang="en-US" dirty="0"/>
-              <a:t>4/3/19</a:t>
+              <a:t>4/4/2019</a:t>
             </a:fld>
             <a:endParaRPr lang="en-US" dirty="0"/>
           </a:p>
@@ -2202,7 +2203,7 @@
           <a:p>
             <a:fld id="{87DE6118-2437-4B30-8E3C-4D2BE6020583}" type="datetimeFigureOut">
               <a:rPr lang="en-US" dirty="0"/>
-              <a:t>4/3/19</a:t>
+              <a:t>4/4/2019</a:t>
             </a:fld>
             <a:endParaRPr lang="en-US" dirty="0"/>
           </a:p>
@@ -2292,7 +2293,7 @@
           <a:p>
             <a:fld id="{87DE6118-2437-4B30-8E3C-4D2BE6020583}" type="datetimeFigureOut">
               <a:rPr lang="en-US" dirty="0"/>
-              <a:t>4/3/19</a:t>
+              <a:t>4/4/2019</a:t>
             </a:fld>
             <a:endParaRPr lang="en-US" dirty="0"/>
           </a:p>
@@ -2634,7 +2635,7 @@
             <a:fld id="{87DE6118-2437-4B30-8E3C-4D2BE6020583}" type="datetimeFigureOut">
               <a:rPr lang="en-US" dirty="0"/>
               <a:pPr/>
-              <a:t>4/3/19</a:t>
+              <a:t>4/4/2019</a:t>
             </a:fld>
             <a:endParaRPr lang="en-US" dirty="0"/>
           </a:p>
@@ -3019,7 +3020,7 @@
             <a:fld id="{87DE6118-2437-4B30-8E3C-4D2BE6020583}" type="datetimeFigureOut">
               <a:rPr lang="en-US" dirty="0"/>
               <a:pPr/>
-              <a:t>4/3/19</a:t>
+              <a:t>4/4/2019</a:t>
             </a:fld>
             <a:endParaRPr lang="en-US" dirty="0"/>
           </a:p>
@@ -3294,7 +3295,7 @@
             <a:fld id="{87DE6118-2437-4B30-8E3C-4D2BE6020583}" type="datetimeFigureOut">
               <a:rPr lang="en-US" dirty="0"/>
               <a:pPr/>
-              <a:t>4/3/19</a:t>
+              <a:t>4/4/2019</a:t>
             </a:fld>
             <a:endParaRPr lang="en-US" dirty="0"/>
           </a:p>
@@ -4545,21 +4546,17 @@
           <a:p>
             <a:r>
               <a:rPr lang="en-US" dirty="0"/>
-              <a:t>Find nodes…</a:t>
-            </a:r>
-          </a:p>
-          <a:p>
-            <a:pPr lvl="1"/>
-            <a:r>
-              <a:rPr lang="en-US" dirty="0"/>
-              <a:t>Asynchronous requests to alpha nodes, keeping tabs on the closest k…</a:t>
-            </a:r>
-          </a:p>
-          <a:p>
-            <a:r>
-              <a:rPr lang="en-US" dirty="0"/>
-              <a:t>Each request halves the distance to the search value.</a:t>
-            </a:r>
+              <a:t>Iterative, parallel algorithm</a:t>
+            </a:r>
+          </a:p>
+          <a:p>
+            <a:r>
+              <a:rPr lang="en-US" dirty="0"/>
+              <a:t>Each iteration halves the distance to the target value/node</a:t>
+            </a:r>
+          </a:p>
+          <a:p>
+            <a:endParaRPr lang="en-US" dirty="0"/>
           </a:p>
         </p:txBody>
       </p:sp>
@@ -4607,6 +4604,183 @@
 </file>
 
 <file path=ppt/slides/slide7.xml><?xml version="1.0" encoding="utf-8"?>
+<p:sld xmlns:a="http://schemas.openxmlformats.org/drawingml/2006/main" xmlns:r="http://schemas.openxmlformats.org/officeDocument/2006/relationships" xmlns:p="http://schemas.openxmlformats.org/presentationml/2006/main">
+  <p:cSld>
+    <p:bg>
+      <p:bgPr>
+        <a:solidFill>
+          <a:schemeClr val="bg2"/>
+        </a:solidFill>
+        <a:effectLst/>
+      </p:bgPr>
+    </p:bg>
+    <p:spTree>
+      <p:nvGrpSpPr>
+        <p:cNvPr id="1" name=""/>
+        <p:cNvGrpSpPr/>
+        <p:nvPr/>
+      </p:nvGrpSpPr>
+      <p:grpSpPr>
+        <a:xfrm>
+          <a:off x="0" y="0"/>
+          <a:ext cx="0" cy="0"/>
+          <a:chOff x="0" y="0"/>
+          <a:chExt cx="0" cy="0"/>
+        </a:xfrm>
+      </p:grpSpPr>
+      <p:sp>
+        <p:nvSpPr>
+          <p:cNvPr id="2" name="Title 1">
+            <a:extLst>
+              <a:ext uri="{FF2B5EF4-FFF2-40B4-BE49-F238E27FC236}">
+                <a16:creationId xmlns:a16="http://schemas.microsoft.com/office/drawing/2014/main" id="{97A8F475-F5F1-42A2-AC94-32C93834BBAE}"/>
+              </a:ext>
+            </a:extLst>
+          </p:cNvPr>
+          <p:cNvSpPr>
+            <a:spLocks noGrp="1"/>
+          </p:cNvSpPr>
+          <p:nvPr>
+            <p:ph type="title"/>
+          </p:nvPr>
+        </p:nvSpPr>
+        <p:spPr>
+          <a:xfrm>
+            <a:off x="1371600" y="685800"/>
+            <a:ext cx="9601200" cy="1485900"/>
+          </a:xfrm>
+        </p:spPr>
+        <p:txBody>
+          <a:bodyPr/>
+          <a:lstStyle/>
+          <a:p>
+            <a:r>
+              <a:rPr lang="en-US" dirty="0"/>
+              <a:t>Find Node Algorithm</a:t>
+            </a:r>
+          </a:p>
+        </p:txBody>
+      </p:sp>
+      <p:sp>
+        <p:nvSpPr>
+          <p:cNvPr id="3" name="Content Placeholder 2">
+            <a:extLst>
+              <a:ext uri="{FF2B5EF4-FFF2-40B4-BE49-F238E27FC236}">
+                <a16:creationId xmlns:a16="http://schemas.microsoft.com/office/drawing/2014/main" id="{DC476FB4-8283-4C73-90D7-928B9D5C95CD}"/>
+              </a:ext>
+            </a:extLst>
+          </p:cNvPr>
+          <p:cNvSpPr>
+            <a:spLocks noGrp="1"/>
+          </p:cNvSpPr>
+          <p:nvPr>
+            <p:ph idx="1"/>
+          </p:nvPr>
+        </p:nvSpPr>
+        <p:spPr>
+          <a:xfrm>
+            <a:off x="1371600" y="2286000"/>
+            <a:ext cx="9601200" cy="3581400"/>
+          </a:xfrm>
+        </p:spPr>
+        <p:txBody>
+          <a:bodyPr>
+            <a:normAutofit/>
+          </a:bodyPr>
+          <a:lstStyle/>
+          <a:p>
+            <a:r>
+              <a:rPr lang="en-US" b="1"/>
+              <a:t>Shortlist: </a:t>
+            </a:r>
+            <a:r>
+              <a:rPr lang="en-US"/>
+              <a:t>the list of nodes selected from to search with</a:t>
+            </a:r>
+          </a:p>
+          <a:p>
+            <a:r>
+              <a:rPr lang="en-US" b="1"/>
+              <a:t>Alpha: </a:t>
+            </a:r>
+            <a:r>
+              <a:rPr lang="en-US"/>
+              <a:t>the parameter for concurrency (how many nodes selected at once)</a:t>
+            </a:r>
+          </a:p>
+          <a:p>
+            <a:pPr lvl="1"/>
+            <a:r>
+              <a:rPr lang="en-US"/>
+              <a:t>Handled by the asyncio library</a:t>
+            </a:r>
+          </a:p>
+          <a:p>
+            <a:r>
+              <a:rPr lang="en-US"/>
+              <a:t>Ends when: node found, k nodes have been searched, or the shortlist is empty</a:t>
+            </a:r>
+          </a:p>
+          <a:p>
+            <a:pPr lvl="1"/>
+            <a:r>
+              <a:rPr lang="en-US"/>
+              <a:t>Returns the k-closest contacts found</a:t>
+            </a:r>
+          </a:p>
+          <a:p>
+            <a:r>
+              <a:rPr lang="en-US"/>
+              <a:t>The Find Value search is similar to Node Search</a:t>
+            </a:r>
+            <a:endParaRPr lang="en-US" dirty="0"/>
+          </a:p>
+        </p:txBody>
+      </p:sp>
+      <p:pic>
+        <p:nvPicPr>
+          <p:cNvPr id="18" name="Picture 17">
+            <a:extLst>
+              <a:ext uri="{FF2B5EF4-FFF2-40B4-BE49-F238E27FC236}">
+                <a16:creationId xmlns:a16="http://schemas.microsoft.com/office/drawing/2014/main" id="{0CE63E86-6D5B-46E2-B782-4B5A8A3B0920}"/>
+              </a:ext>
+            </a:extLst>
+          </p:cNvPr>
+          <p:cNvPicPr>
+            <a:picLocks noChangeAspect="1"/>
+          </p:cNvPicPr>
+          <p:nvPr/>
+        </p:nvPicPr>
+        <p:blipFill>
+          <a:blip r:embed="rId2"/>
+          <a:stretch>
+            <a:fillRect/>
+          </a:stretch>
+        </p:blipFill>
+        <p:spPr>
+          <a:xfrm>
+            <a:off x="8829967" y="480310"/>
+            <a:ext cx="2847509" cy="1896880"/>
+          </a:xfrm>
+          <a:prstGeom prst="rect">
+            <a:avLst/>
+          </a:prstGeom>
+        </p:spPr>
+      </p:pic>
+    </p:spTree>
+    <p:extLst>
+      <p:ext uri="{BB962C8B-B14F-4D97-AF65-F5344CB8AC3E}">
+        <p14:creationId xmlns:p14="http://schemas.microsoft.com/office/powerpoint/2010/main" val="4083028638"/>
+      </p:ext>
+    </p:extLst>
+  </p:cSld>
+  <p:clrMapOvr>
+    <a:masterClrMapping/>
+  </p:clrMapOvr>
+</p:sld>
+</file>
+
+<file path=ppt/slides/slide8.xml><?xml version="1.0" encoding="utf-8"?>
 <p:sld xmlns:a="http://schemas.openxmlformats.org/drawingml/2006/main" xmlns:r="http://schemas.openxmlformats.org/officeDocument/2006/relationships" xmlns:p="http://schemas.openxmlformats.org/presentationml/2006/main">
   <p:cSld>
     <p:spTree>

</xml_diff>

<commit_message>
changed pic on Find Node algorithm
</commit_message>
<xml_diff>
--- a/report/presentation.pptx
+++ b/report/presentation.pptx
@@ -4690,59 +4690,66 @@
           <a:lstStyle/>
           <a:p>
             <a:r>
-              <a:rPr lang="en-US" b="1"/>
+              <a:rPr lang="en-US" b="1" dirty="0"/>
               <a:t>Shortlist: </a:t>
             </a:r>
             <a:r>
-              <a:rPr lang="en-US"/>
+              <a:rPr lang="en-US" dirty="0"/>
               <a:t>the list of nodes selected from to search with</a:t>
             </a:r>
           </a:p>
           <a:p>
             <a:r>
-              <a:rPr lang="en-US" b="1"/>
+              <a:rPr lang="en-US" b="1" dirty="0"/>
               <a:t>Alpha: </a:t>
             </a:r>
             <a:r>
-              <a:rPr lang="en-US"/>
+              <a:rPr lang="en-US" dirty="0"/>
               <a:t>the parameter for concurrency (how many nodes selected at once)</a:t>
             </a:r>
           </a:p>
           <a:p>
             <a:pPr lvl="1"/>
             <a:r>
-              <a:rPr lang="en-US"/>
-              <a:t>Handled by the asyncio library</a:t>
-            </a:r>
-          </a:p>
-          <a:p>
-            <a:r>
-              <a:rPr lang="en-US"/>
+              <a:rPr lang="en-US" dirty="0"/>
+              <a:t>Handled by the </a:t>
+            </a:r>
+            <a:r>
+              <a:rPr lang="en-US" dirty="0" err="1"/>
+              <a:t>asyncio</a:t>
+            </a:r>
+            <a:r>
+              <a:rPr lang="en-US" dirty="0"/>
+              <a:t> library</a:t>
+            </a:r>
+          </a:p>
+          <a:p>
+            <a:r>
+              <a:rPr lang="en-US" dirty="0"/>
               <a:t>Ends when: node found, k nodes have been searched, or the shortlist is empty</a:t>
             </a:r>
           </a:p>
           <a:p>
             <a:pPr lvl="1"/>
             <a:r>
-              <a:rPr lang="en-US"/>
+              <a:rPr lang="en-US" dirty="0"/>
               <a:t>Returns the k-closest contacts found</a:t>
             </a:r>
           </a:p>
           <a:p>
             <a:r>
-              <a:rPr lang="en-US"/>
+              <a:rPr lang="en-US" dirty="0"/>
               <a:t>The Find Value search is similar to Node Search</a:t>
             </a:r>
-            <a:endParaRPr lang="en-US" dirty="0"/>
           </a:p>
         </p:txBody>
       </p:sp>
       <p:pic>
         <p:nvPicPr>
-          <p:cNvPr id="18" name="Picture 17">
+          <p:cNvPr id="24" name="Picture 23">
             <a:extLst>
               <a:ext uri="{FF2B5EF4-FFF2-40B4-BE49-F238E27FC236}">
-                <a16:creationId xmlns:a16="http://schemas.microsoft.com/office/drawing/2014/main" id="{0CE63E86-6D5B-46E2-B782-4B5A8A3B0920}"/>
+                <a16:creationId xmlns:a16="http://schemas.microsoft.com/office/drawing/2014/main" id="{496397F4-52E4-41E6-98A8-8287321ACC8F}"/>
               </a:ext>
             </a:extLst>
           </p:cNvPr>
@@ -4759,8 +4766,8 @@
         </p:blipFill>
         <p:spPr>
           <a:xfrm>
-            <a:off x="8829967" y="480310"/>
-            <a:ext cx="2847509" cy="1896880"/>
+            <a:off x="8298613" y="4209691"/>
+            <a:ext cx="3172133" cy="2378020"/>
           </a:xfrm>
           <a:prstGeom prst="rect">
             <a:avLst/>

</xml_diff>